<commit_message>
[AI] Update T01 (Final)
</commit_message>
<xml_diff>
--- a/ArtificalIntelligence/T01_Searching/answer.pptx
+++ b/ArtificalIntelligence/T01_Searching/answer.pptx
@@ -261,7 +261,7 @@
           <a:p>
             <a:fld id="{BD77F5E6-84AB-4825-AF43-560C4CC793F3}" type="datetimeFigureOut">
               <a:rPr lang="zh-CN" altLang="en-US" smtClean="0"/>
-              <a:t>2019/9/24</a:t>
+              <a:t>2019/9/25</a:t>
             </a:fld>
             <a:endParaRPr lang="zh-CN" altLang="en-US"/>
           </a:p>
@@ -459,7 +459,7 @@
           <a:p>
             <a:fld id="{BD77F5E6-84AB-4825-AF43-560C4CC793F3}" type="datetimeFigureOut">
               <a:rPr lang="zh-CN" altLang="en-US" smtClean="0"/>
-              <a:t>2019/9/24</a:t>
+              <a:t>2019/9/25</a:t>
             </a:fld>
             <a:endParaRPr lang="zh-CN" altLang="en-US"/>
           </a:p>
@@ -667,7 +667,7 @@
           <a:p>
             <a:fld id="{BD77F5E6-84AB-4825-AF43-560C4CC793F3}" type="datetimeFigureOut">
               <a:rPr lang="zh-CN" altLang="en-US" smtClean="0"/>
-              <a:t>2019/9/24</a:t>
+              <a:t>2019/9/25</a:t>
             </a:fld>
             <a:endParaRPr lang="zh-CN" altLang="en-US"/>
           </a:p>
@@ -865,7 +865,7 @@
           <a:p>
             <a:fld id="{BD77F5E6-84AB-4825-AF43-560C4CC793F3}" type="datetimeFigureOut">
               <a:rPr lang="zh-CN" altLang="en-US" smtClean="0"/>
-              <a:t>2019/9/24</a:t>
+              <a:t>2019/9/25</a:t>
             </a:fld>
             <a:endParaRPr lang="zh-CN" altLang="en-US"/>
           </a:p>
@@ -1140,7 +1140,7 @@
           <a:p>
             <a:fld id="{BD77F5E6-84AB-4825-AF43-560C4CC793F3}" type="datetimeFigureOut">
               <a:rPr lang="zh-CN" altLang="en-US" smtClean="0"/>
-              <a:t>2019/9/24</a:t>
+              <a:t>2019/9/25</a:t>
             </a:fld>
             <a:endParaRPr lang="zh-CN" altLang="en-US"/>
           </a:p>
@@ -1405,7 +1405,7 @@
           <a:p>
             <a:fld id="{BD77F5E6-84AB-4825-AF43-560C4CC793F3}" type="datetimeFigureOut">
               <a:rPr lang="zh-CN" altLang="en-US" smtClean="0"/>
-              <a:t>2019/9/24</a:t>
+              <a:t>2019/9/25</a:t>
             </a:fld>
             <a:endParaRPr lang="zh-CN" altLang="en-US"/>
           </a:p>
@@ -1817,7 +1817,7 @@
           <a:p>
             <a:fld id="{BD77F5E6-84AB-4825-AF43-560C4CC793F3}" type="datetimeFigureOut">
               <a:rPr lang="zh-CN" altLang="en-US" smtClean="0"/>
-              <a:t>2019/9/24</a:t>
+              <a:t>2019/9/25</a:t>
             </a:fld>
             <a:endParaRPr lang="zh-CN" altLang="en-US"/>
           </a:p>
@@ -1958,7 +1958,7 @@
           <a:p>
             <a:fld id="{BD77F5E6-84AB-4825-AF43-560C4CC793F3}" type="datetimeFigureOut">
               <a:rPr lang="zh-CN" altLang="en-US" smtClean="0"/>
-              <a:t>2019/9/24</a:t>
+              <a:t>2019/9/25</a:t>
             </a:fld>
             <a:endParaRPr lang="zh-CN" altLang="en-US"/>
           </a:p>
@@ -2071,7 +2071,7 @@
           <a:p>
             <a:fld id="{BD77F5E6-84AB-4825-AF43-560C4CC793F3}" type="datetimeFigureOut">
               <a:rPr lang="zh-CN" altLang="en-US" smtClean="0"/>
-              <a:t>2019/9/24</a:t>
+              <a:t>2019/9/25</a:t>
             </a:fld>
             <a:endParaRPr lang="zh-CN" altLang="en-US"/>
           </a:p>
@@ -2382,7 +2382,7 @@
           <a:p>
             <a:fld id="{BD77F5E6-84AB-4825-AF43-560C4CC793F3}" type="datetimeFigureOut">
               <a:rPr lang="zh-CN" altLang="en-US" smtClean="0"/>
-              <a:t>2019/9/24</a:t>
+              <a:t>2019/9/25</a:t>
             </a:fld>
             <a:endParaRPr lang="zh-CN" altLang="en-US"/>
           </a:p>
@@ -2670,7 +2670,7 @@
           <a:p>
             <a:fld id="{BD77F5E6-84AB-4825-AF43-560C4CC793F3}" type="datetimeFigureOut">
               <a:rPr lang="zh-CN" altLang="en-US" smtClean="0"/>
-              <a:t>2019/9/24</a:t>
+              <a:t>2019/9/25</a:t>
             </a:fld>
             <a:endParaRPr lang="zh-CN" altLang="en-US"/>
           </a:p>
@@ -2911,7 +2911,7 @@
           <a:p>
             <a:fld id="{BD77F5E6-84AB-4825-AF43-560C4CC793F3}" type="datetimeFigureOut">
               <a:rPr lang="zh-CN" altLang="en-US" smtClean="0"/>
-              <a:t>2019/9/24</a:t>
+              <a:t>2019/9/25</a:t>
             </a:fld>
             <a:endParaRPr lang="zh-CN" altLang="en-US"/>
           </a:p>
@@ -7527,10 +7527,10 @@
       </p:grpSpPr>
       <p:grpSp>
         <p:nvGrpSpPr>
-          <p:cNvPr id="33" name="组合 32">
-            <a:extLst>
-              <a:ext uri="{FF2B5EF4-FFF2-40B4-BE49-F238E27FC236}">
-                <a16:creationId xmlns:a16="http://schemas.microsoft.com/office/drawing/2014/main" id="{C24B0E51-FF4B-4C62-ABC9-71ED5999B567}"/>
+          <p:cNvPr id="2" name="组合 1">
+            <a:extLst>
+              <a:ext uri="{FF2B5EF4-FFF2-40B4-BE49-F238E27FC236}">
+                <a16:creationId xmlns:a16="http://schemas.microsoft.com/office/drawing/2014/main" id="{5797D018-7255-432A-8E44-8003D0048910}"/>
               </a:ext>
             </a:extLst>
           </p:cNvPr>
@@ -8125,8 +8125,8 @@
           </p:nvSpPr>
           <p:spPr>
             <a:xfrm>
-              <a:off x="5212872" y="998919"/>
-              <a:ext cx="784645" cy="477054"/>
+              <a:off x="5381089" y="985091"/>
+              <a:ext cx="876836" cy="477054"/>
             </a:xfrm>
             <a:prstGeom prst="rect">
               <a:avLst/>
@@ -8153,7 +8153,7 @@
                     <a:srgbClr val="FF0000"/>
                   </a:solidFill>
                 </a:rPr>
-                <a:t>,-1</a:t>
+                <a:t>, 3</a:t>
               </a:r>
               <a:endParaRPr lang="zh-CN" altLang="en-US" sz="2500" dirty="0">
                 <a:solidFill>
@@ -8177,8 +8177,8 @@
           </p:nvSpPr>
           <p:spPr>
             <a:xfrm>
-              <a:off x="5997517" y="3428998"/>
-              <a:ext cx="517943" cy="477054"/>
+              <a:off x="6138719" y="3467094"/>
+              <a:ext cx="250261" cy="477054"/>
             </a:xfrm>
             <a:prstGeom prst="rect">
               <a:avLst/>
@@ -8197,7 +8197,7 @@
                     <a:srgbClr val="FF0000"/>
                   </a:solidFill>
                 </a:rPr>
-                <a:t>-1</a:t>
+                <a:t>1</a:t>
               </a:r>
               <a:endParaRPr lang="zh-CN" altLang="en-US" sz="2500" dirty="0">
                 <a:solidFill>
@@ -8222,7 +8222,7 @@
           <p:spPr>
             <a:xfrm>
               <a:off x="7104578" y="1933572"/>
-              <a:ext cx="517943" cy="477054"/>
+              <a:ext cx="917097" cy="477054"/>
             </a:xfrm>
             <a:prstGeom prst="rect">
               <a:avLst/>
@@ -8236,12 +8236,20 @@
             <a:lstStyle/>
             <a:p>
               <a:r>
+                <a:rPr lang="en-US" altLang="zh-CN" sz="2500" strike="sngStrike" dirty="0">
+                  <a:solidFill>
+                    <a:srgbClr val="FF0000"/>
+                  </a:solidFill>
+                </a:rPr>
+                <a:t>1</a:t>
+              </a:r>
+              <a:r>
                 <a:rPr lang="en-US" altLang="zh-CN" sz="2500" dirty="0">
                   <a:solidFill>
                     <a:srgbClr val="FF0000"/>
                   </a:solidFill>
                 </a:rPr>
-                <a:t>-1</a:t>
+                <a:t>, 3</a:t>
               </a:r>
               <a:endParaRPr lang="zh-CN" altLang="en-US" sz="2500" dirty="0">
                 <a:solidFill>
@@ -8265,8 +8273,8 @@
           </p:nvSpPr>
           <p:spPr>
             <a:xfrm>
-              <a:off x="7211768" y="3467094"/>
-              <a:ext cx="517943" cy="477054"/>
+              <a:off x="7467187" y="3467094"/>
+              <a:ext cx="262524" cy="477054"/>
             </a:xfrm>
             <a:prstGeom prst="rect">
               <a:avLst/>
@@ -8285,7 +8293,7 @@
                     <a:srgbClr val="FF0000"/>
                   </a:solidFill>
                 </a:rPr>
-                <a:t>-2</a:t>
+                <a:t>3</a:t>
               </a:r>
               <a:endParaRPr lang="zh-CN" altLang="en-US" sz="2500" dirty="0">
                 <a:solidFill>
@@ -8397,7 +8405,7 @@
           </p:nvSpPr>
           <p:spPr>
             <a:xfrm>
-              <a:off x="8713129" y="3428997"/>
+              <a:off x="8653413" y="3467094"/>
               <a:ext cx="788948" cy="477054"/>
             </a:xfrm>
             <a:prstGeom prst="rect">
@@ -8494,6 +8502,170 @@
           <p:spPr>
             <a:xfrm flipV="1">
               <a:off x="10178000" y="1933572"/>
+              <a:ext cx="266338" cy="333375"/>
+            </a:xfrm>
+            <a:prstGeom prst="line">
+              <a:avLst/>
+            </a:prstGeom>
+            <a:ln w="57150">
+              <a:solidFill>
+                <a:srgbClr val="FF0000"/>
+              </a:solidFill>
+            </a:ln>
+          </p:spPr>
+          <p:style>
+            <a:lnRef idx="1">
+              <a:schemeClr val="accent1"/>
+            </a:lnRef>
+            <a:fillRef idx="0">
+              <a:schemeClr val="accent1"/>
+            </a:fillRef>
+            <a:effectRef idx="0">
+              <a:schemeClr val="accent1"/>
+            </a:effectRef>
+            <a:fontRef idx="minor">
+              <a:schemeClr val="tx1"/>
+            </a:fontRef>
+          </p:style>
+        </p:cxnSp>
+        <p:cxnSp>
+          <p:nvCxnSpPr>
+            <p:cNvPr id="27" name="直接连接符 26">
+              <a:extLst>
+                <a:ext uri="{FF2B5EF4-FFF2-40B4-BE49-F238E27FC236}">
+                  <a16:creationId xmlns:a16="http://schemas.microsoft.com/office/drawing/2014/main" id="{E80D87EA-B53C-4B33-B8DC-EA99C3D51787}"/>
+                </a:ext>
+              </a:extLst>
+            </p:cNvPr>
+            <p:cNvCxnSpPr/>
+            <p:nvPr/>
+          </p:nvCxnSpPr>
+          <p:spPr>
+            <a:xfrm flipV="1">
+              <a:off x="4486456" y="4457694"/>
+              <a:ext cx="266338" cy="333375"/>
+            </a:xfrm>
+            <a:prstGeom prst="line">
+              <a:avLst/>
+            </a:prstGeom>
+            <a:ln w="57150">
+              <a:solidFill>
+                <a:srgbClr val="FF0000"/>
+              </a:solidFill>
+            </a:ln>
+          </p:spPr>
+          <p:style>
+            <a:lnRef idx="1">
+              <a:schemeClr val="accent1"/>
+            </a:lnRef>
+            <a:fillRef idx="0">
+              <a:schemeClr val="accent1"/>
+            </a:fillRef>
+            <a:effectRef idx="0">
+              <a:schemeClr val="accent1"/>
+            </a:effectRef>
+            <a:fontRef idx="minor">
+              <a:schemeClr val="tx1"/>
+            </a:fontRef>
+          </p:style>
+        </p:cxnSp>
+        <p:cxnSp>
+          <p:nvCxnSpPr>
+            <p:cNvPr id="34" name="直接连接符 33">
+              <a:extLst>
+                <a:ext uri="{FF2B5EF4-FFF2-40B4-BE49-F238E27FC236}">
+                  <a16:creationId xmlns:a16="http://schemas.microsoft.com/office/drawing/2014/main" id="{BAB293ED-41B4-4BD3-AAD7-00F528F92775}"/>
+                </a:ext>
+              </a:extLst>
+            </p:cNvPr>
+            <p:cNvCxnSpPr/>
+            <p:nvPr/>
+          </p:nvCxnSpPr>
+          <p:spPr>
+            <a:xfrm flipV="1">
+              <a:off x="6515462" y="4448174"/>
+              <a:ext cx="266338" cy="333375"/>
+            </a:xfrm>
+            <a:prstGeom prst="line">
+              <a:avLst/>
+            </a:prstGeom>
+            <a:ln w="57150">
+              <a:solidFill>
+                <a:srgbClr val="FF0000"/>
+              </a:solidFill>
+            </a:ln>
+          </p:spPr>
+          <p:style>
+            <a:lnRef idx="1">
+              <a:schemeClr val="accent1"/>
+            </a:lnRef>
+            <a:fillRef idx="0">
+              <a:schemeClr val="accent1"/>
+            </a:fillRef>
+            <a:effectRef idx="0">
+              <a:schemeClr val="accent1"/>
+            </a:effectRef>
+            <a:fontRef idx="minor">
+              <a:schemeClr val="tx1"/>
+            </a:fontRef>
+          </p:style>
+        </p:cxnSp>
+        <p:cxnSp>
+          <p:nvCxnSpPr>
+            <p:cNvPr id="35" name="直接连接符 34">
+              <a:extLst>
+                <a:ext uri="{FF2B5EF4-FFF2-40B4-BE49-F238E27FC236}">
+                  <a16:creationId xmlns:a16="http://schemas.microsoft.com/office/drawing/2014/main" id="{D9B3A10B-F604-4464-8315-2FFC637F1359}"/>
+                </a:ext>
+              </a:extLst>
+            </p:cNvPr>
+            <p:cNvCxnSpPr/>
+            <p:nvPr/>
+          </p:nvCxnSpPr>
+          <p:spPr>
+            <a:xfrm flipV="1">
+              <a:off x="7755955" y="4457694"/>
+              <a:ext cx="266338" cy="333375"/>
+            </a:xfrm>
+            <a:prstGeom prst="line">
+              <a:avLst/>
+            </a:prstGeom>
+            <a:ln w="57150">
+              <a:solidFill>
+                <a:srgbClr val="FF0000"/>
+              </a:solidFill>
+            </a:ln>
+          </p:spPr>
+          <p:style>
+            <a:lnRef idx="1">
+              <a:schemeClr val="accent1"/>
+            </a:lnRef>
+            <a:fillRef idx="0">
+              <a:schemeClr val="accent1"/>
+            </a:fillRef>
+            <a:effectRef idx="0">
+              <a:schemeClr val="accent1"/>
+            </a:effectRef>
+            <a:fontRef idx="minor">
+              <a:schemeClr val="tx1"/>
+            </a:fontRef>
+          </p:style>
+        </p:cxnSp>
+        <p:cxnSp>
+          <p:nvCxnSpPr>
+            <p:cNvPr id="36" name="直接连接符 35">
+              <a:extLst>
+                <a:ext uri="{FF2B5EF4-FFF2-40B4-BE49-F238E27FC236}">
+                  <a16:creationId xmlns:a16="http://schemas.microsoft.com/office/drawing/2014/main" id="{72C63236-9F9D-45B9-8C53-86894774A26B}"/>
+                </a:ext>
+              </a:extLst>
+            </p:cNvPr>
+            <p:cNvCxnSpPr/>
+            <p:nvPr/>
+          </p:nvCxnSpPr>
+          <p:spPr>
+            <a:xfrm flipV="1">
+              <a:off x="8520244" y="4448174"/>
               <a:ext cx="266338" cy="333375"/>
             </a:xfrm>
             <a:prstGeom prst="line">

</xml_diff>